<commit_message>
updated with github repo
</commit_message>
<xml_diff>
--- a/MOC2025-09-25-LPO-FinTech.pptx
+++ b/MOC2025-09-25-LPO-FinTech.pptx
@@ -5,10 +5,10 @@
     <p:sldMasterId id="2147483872" r:id="rId4"/>
   </p:sldMasterIdLst>
   <p:notesMasterIdLst>
-    <p:notesMasterId r:id="rId21"/>
+    <p:notesMasterId r:id="rId23"/>
   </p:notesMasterIdLst>
   <p:handoutMasterIdLst>
-    <p:handoutMasterId r:id="rId22"/>
+    <p:handoutMasterId r:id="rId24"/>
   </p:handoutMasterIdLst>
   <p:sldIdLst>
     <p:sldId id="298" r:id="rId5"/>
@@ -26,30 +26,32 @@
     <p:sldId id="320" r:id="rId17"/>
     <p:sldId id="310" r:id="rId18"/>
     <p:sldId id="321" r:id="rId19"/>
-    <p:sldId id="282" r:id="rId20"/>
+    <p:sldId id="322" r:id="rId20"/>
+    <p:sldId id="323" r:id="rId21"/>
+    <p:sldId id="282" r:id="rId22"/>
   </p:sldIdLst>
   <p:sldSz cx="12192000" cy="6858000"/>
   <p:notesSz cx="6858000" cy="9144000"/>
   <p:embeddedFontLst>
     <p:embeddedFont>
       <p:font typeface="Source Sans Pro" panose="020B0503030403020204" pitchFamily="34" charset="0"/>
-      <p:regular r:id="rId23"/>
-      <p:bold r:id="rId24"/>
-      <p:italic r:id="rId25"/>
-      <p:boldItalic r:id="rId26"/>
+      <p:regular r:id="rId25"/>
+      <p:bold r:id="rId26"/>
+      <p:italic r:id="rId27"/>
+      <p:boldItalic r:id="rId28"/>
     </p:embeddedFont>
     <p:embeddedFont>
       <p:font typeface="Source Sans Pro Bold" panose="020B0503030403020204" pitchFamily="34" charset="0"/>
-      <p:bold r:id="rId27"/>
-      <p:italic r:id="rId28"/>
-      <p:boldItalic r:id="rId29"/>
+      <p:bold r:id="rId29"/>
+      <p:italic r:id="rId30"/>
+      <p:boldItalic r:id="rId31"/>
     </p:embeddedFont>
     <p:embeddedFont>
       <p:font typeface="Source Serif Pro" panose="02040603050405020204" pitchFamily="18" charset="0"/>
-      <p:regular r:id="rId30"/>
-      <p:bold r:id="rId31"/>
-      <p:italic r:id="rId32"/>
-      <p:boldItalic r:id="rId33"/>
+      <p:regular r:id="rId32"/>
+      <p:bold r:id="rId33"/>
+      <p:italic r:id="rId34"/>
+      <p:boldItalic r:id="rId35"/>
     </p:embeddedFont>
   </p:embeddedFontLst>
   <p:defaultTextStyle>
@@ -5218,7 +5220,7 @@
           <a:p>
             <a:fld id="{BC8B6640-4434-C947-AC85-94372C485829}" type="datetimeFigureOut">
               <a:rPr lang="de-DE"/>
-              <a:t>24.09.25</a:t>
+              <a:t>25.09.25</a:t>
             </a:fld>
             <a:endParaRPr lang="de-DE"/>
           </a:p>
@@ -5383,7 +5385,7 @@
           <a:p>
             <a:fld id="{D3B7C82C-DD4D-490F-8868-2B1C3B47698B}" type="datetimeFigureOut">
               <a:rPr lang="en-GB" smtClean="0"/>
-              <a:t>24/09/2025</a:t>
+              <a:t>25/09/2025</a:t>
             </a:fld>
             <a:endParaRPr lang="en-GB"/>
           </a:p>
@@ -7640,6 +7642,90 @@
           <a:bodyPr/>
           <a:lstStyle/>
           <a:p>
+            <a:pPr>
+              <a:lnSpc>
+                <a:spcPct val="120000"/>
+              </a:lnSpc>
+            </a:pPr>
+            <a:r>
+              <a:rPr lang="en-GB" sz="1200" b="1" dirty="0">
+                <a:solidFill>
+                  <a:schemeClr val="bg1"/>
+                </a:solidFill>
+              </a:rPr>
+              <a:t>Data in </a:t>
+            </a:r>
+            <a:r>
+              <a:rPr lang="en-GB" sz="1200" b="1" dirty="0" err="1">
+                <a:solidFill>
+                  <a:schemeClr val="bg1"/>
+                </a:solidFill>
+              </a:rPr>
+              <a:t>Github</a:t>
+            </a:r>
+            <a:r>
+              <a:rPr lang="en-GB" sz="1200" b="1" dirty="0">
+                <a:solidFill>
+                  <a:schemeClr val="bg1"/>
+                </a:solidFill>
+              </a:rPr>
+              <a:t>: </a:t>
+            </a:r>
+          </a:p>
+          <a:p>
+            <a:r>
+              <a:rPr lang="en-GB" b="1" dirty="0">
+                <a:solidFill>
+                  <a:schemeClr val="bg1"/>
+                </a:solidFill>
+              </a:rPr>
+              <a:t>https://</a:t>
+            </a:r>
+            <a:r>
+              <a:rPr lang="en-GB" b="1" dirty="0" err="1">
+                <a:solidFill>
+                  <a:schemeClr val="bg1"/>
+                </a:solidFill>
+              </a:rPr>
+              <a:t>github.com</a:t>
+            </a:r>
+            <a:r>
+              <a:rPr lang="en-GB" b="1" dirty="0">
+                <a:solidFill>
+                  <a:schemeClr val="bg1"/>
+                </a:solidFill>
+              </a:rPr>
+              <a:t>/Prof-it/</a:t>
+            </a:r>
+            <a:r>
+              <a:rPr lang="en-GB" b="1" dirty="0" err="1">
+                <a:solidFill>
+                  <a:schemeClr val="bg1"/>
+                </a:solidFill>
+              </a:rPr>
+              <a:t>llm</a:t>
+            </a:r>
+            <a:r>
+              <a:rPr lang="en-GB" b="1" dirty="0">
+                <a:solidFill>
+                  <a:schemeClr val="bg1"/>
+                </a:solidFill>
+              </a:rPr>
+              <a:t>-observability</a:t>
+            </a:r>
+          </a:p>
+          <a:p>
+            <a:br>
+              <a:rPr lang="en-GB" sz="1200" b="1" i="0" u="none" strike="noStrike" kern="1200" dirty="0">
+                <a:solidFill>
+                  <a:schemeClr val="tx1"/>
+                </a:solidFill>
+                <a:effectLst/>
+                <a:latin typeface="+mn-lt"/>
+                <a:ea typeface="+mn-ea"/>
+                <a:cs typeface="+mn-cs"/>
+              </a:rPr>
+            </a:br>
             <a:r>
               <a:rPr lang="en-GB" sz="1200" b="1" i="0" u="none" strike="noStrike" kern="1200" dirty="0">
                 <a:solidFill>
@@ -8071,7 +8157,7 @@
           <a:p>
             <a:fld id="{3DA2CA58-6FD8-4ACA-9D1E-EE4A7346A6C8}" type="slidenum">
               <a:rPr lang="en-GB" smtClean="0"/>
-              <a:t>16</a:t>
+              <a:t>18</a:t>
             </a:fld>
             <a:endParaRPr lang="en-GB"/>
           </a:p>
@@ -9812,7 +9898,7 @@
           <a:p>
             <a:fld id="{9DE2538E-986B-6C46-B955-8C701E8C89AF}" type="datetime1">
               <a:rPr lang="en-US" noProof="0" smtClean="0"/>
-              <a:t>9/24/25</a:t>
+              <a:t>9/25/25</a:t>
             </a:fld>
             <a:endParaRPr lang="en-US" noProof="0"/>
           </a:p>
@@ -10188,7 +10274,7 @@
           <a:p>
             <a:fld id="{3FCE1E22-3AFB-7041-A165-C9D71668285E}" type="datetime1">
               <a:rPr lang="en-US" noProof="0" smtClean="0"/>
-              <a:t>9/24/25</a:t>
+              <a:t>9/25/25</a:t>
             </a:fld>
             <a:endParaRPr lang="en-US" noProof="0"/>
           </a:p>
@@ -10702,7 +10788,7 @@
           <a:p>
             <a:fld id="{C1F6E0D2-EE34-EA4B-A3FA-4E5E952E1C17}" type="datetime1">
               <a:rPr lang="en-US" noProof="0" smtClean="0"/>
-              <a:t>9/24/25</a:t>
+              <a:t>9/25/25</a:t>
             </a:fld>
             <a:endParaRPr lang="en-US" noProof="0"/>
           </a:p>
@@ -11511,7 +11597,7 @@
           <a:p>
             <a:fld id="{51A74134-60D5-7F4D-B1D8-DEC9F64753C6}" type="datetime1">
               <a:rPr lang="en-US" noProof="0" smtClean="0"/>
-              <a:t>9/24/25</a:t>
+              <a:t>9/25/25</a:t>
             </a:fld>
             <a:endParaRPr lang="en-US" noProof="0"/>
           </a:p>
@@ -11883,7 +11969,7 @@
           <a:p>
             <a:fld id="{04CAA61E-7AEC-D342-8104-4DFD59E7350E}" type="datetime1">
               <a:rPr lang="en-US" noProof="0" smtClean="0"/>
-              <a:t>9/24/25</a:t>
+              <a:t>9/25/25</a:t>
             </a:fld>
             <a:endParaRPr lang="en-US" noProof="0"/>
           </a:p>
@@ -12354,7 +12440,7 @@
           <a:p>
             <a:fld id="{9DE2538E-986B-6C46-B955-8C701E8C89AF}" type="datetime1">
               <a:rPr lang="en-US" noProof="0" smtClean="0"/>
-              <a:t>9/24/25</a:t>
+              <a:t>9/25/25</a:t>
             </a:fld>
             <a:endParaRPr lang="en-US" noProof="0"/>
           </a:p>
@@ -13689,7 +13775,7 @@
           <a:p>
             <a:fld id="{9DE2538E-986B-6C46-B955-8C701E8C89AF}" type="datetime1">
               <a:rPr lang="en-US" noProof="0" smtClean="0"/>
-              <a:t>9/24/25</a:t>
+              <a:t>9/25/25</a:t>
             </a:fld>
             <a:endParaRPr lang="en-US" noProof="0"/>
           </a:p>
@@ -14203,7 +14289,7 @@
           <a:p>
             <a:fld id="{9DE2538E-986B-6C46-B955-8C701E8C89AF}" type="datetime1">
               <a:rPr lang="en-US" noProof="0" smtClean="0"/>
-              <a:t>9/24/25</a:t>
+              <a:t>9/25/25</a:t>
             </a:fld>
             <a:endParaRPr lang="en-US" noProof="0"/>
           </a:p>
@@ -14689,7 +14775,7 @@
           <a:p>
             <a:fld id="{9DE2538E-986B-6C46-B955-8C701E8C89AF}" type="datetime1">
               <a:rPr lang="en-US" noProof="0" smtClean="0"/>
-              <a:t>9/24/25</a:t>
+              <a:t>9/25/25</a:t>
             </a:fld>
             <a:endParaRPr lang="en-US" noProof="0"/>
           </a:p>
@@ -15311,7 +15397,7 @@
           <a:p>
             <a:fld id="{9DE2538E-986B-6C46-B955-8C701E8C89AF}" type="datetime1">
               <a:rPr lang="en-US" noProof="0" smtClean="0"/>
-              <a:t>9/24/25</a:t>
+              <a:t>9/25/25</a:t>
             </a:fld>
             <a:endParaRPr lang="en-US" noProof="0"/>
           </a:p>
@@ -15728,7 +15814,7 @@
           <a:p>
             <a:fld id="{3FCE1E22-3AFB-7041-A165-C9D71668285E}" type="datetime1">
               <a:rPr lang="en-US" noProof="0" smtClean="0"/>
-              <a:t>9/24/25</a:t>
+              <a:t>9/25/25</a:t>
             </a:fld>
             <a:endParaRPr lang="en-US" noProof="0"/>
           </a:p>
@@ -16287,7 +16373,7 @@
           <a:p>
             <a:fld id="{C1F6E0D2-EE34-EA4B-A3FA-4E5E952E1C17}" type="datetime1">
               <a:rPr lang="en-US" noProof="0" smtClean="0"/>
-              <a:t>9/24/25</a:t>
+              <a:t>9/25/25</a:t>
             </a:fld>
             <a:endParaRPr lang="en-US" noProof="0"/>
           </a:p>
@@ -16994,7 +17080,7 @@
           <a:p>
             <a:fld id="{51A74134-60D5-7F4D-B1D8-DEC9F64753C6}" type="datetime1">
               <a:rPr lang="en-US" noProof="0" smtClean="0"/>
-              <a:t>9/24/25</a:t>
+              <a:t>9/25/25</a:t>
             </a:fld>
             <a:endParaRPr lang="en-US" noProof="0"/>
           </a:p>
@@ -17523,7 +17609,7 @@
           <a:p>
             <a:fld id="{04CAA61E-7AEC-D342-8104-4DFD59E7350E}" type="datetime1">
               <a:rPr lang="en-US" noProof="0" smtClean="0"/>
-              <a:t>9/24/25</a:t>
+              <a:t>9/25/25</a:t>
             </a:fld>
             <a:endParaRPr lang="en-US" noProof="0"/>
           </a:p>
@@ -18040,7 +18126,7 @@
           <a:p>
             <a:fld id="{9DE2538E-986B-6C46-B955-8C701E8C89AF}" type="datetime1">
               <a:rPr lang="en-US" noProof="0" smtClean="0"/>
-              <a:t>9/24/25</a:t>
+              <a:t>9/25/25</a:t>
             </a:fld>
             <a:endParaRPr lang="en-US" noProof="0"/>
           </a:p>
@@ -19532,7 +19618,7 @@
           <a:p>
             <a:fld id="{9DE2538E-986B-6C46-B955-8C701E8C89AF}" type="datetime1">
               <a:rPr lang="en-US" noProof="0" smtClean="0"/>
-              <a:t>9/24/25</a:t>
+              <a:t>9/25/25</a:t>
             </a:fld>
             <a:endParaRPr lang="en-US" noProof="0"/>
           </a:p>
@@ -20091,7 +20177,7 @@
           <a:p>
             <a:fld id="{9DE2538E-986B-6C46-B955-8C701E8C89AF}" type="datetime1">
               <a:rPr lang="en-US" noProof="0" smtClean="0"/>
-              <a:t>9/24/25</a:t>
+              <a:t>9/25/25</a:t>
             </a:fld>
             <a:endParaRPr lang="en-US" noProof="0"/>
           </a:p>
@@ -20886,7 +20972,7 @@
           <a:p>
             <a:fld id="{A667D0E9-A085-1F44-A74A-809F92B9DFA4}" type="datetime1">
               <a:rPr lang="en-US" noProof="0" smtClean="0"/>
-              <a:t>9/24/25</a:t>
+              <a:t>9/25/25</a:t>
             </a:fld>
             <a:endParaRPr lang="en-US" noProof="0"/>
           </a:p>
@@ -21672,7 +21758,7 @@
           <a:p>
             <a:fld id="{F8FC7848-08BB-9448-B280-C08CC7411D8B}" type="datetime1">
               <a:rPr lang="en-US" noProof="0" smtClean="0"/>
-              <a:t>9/24/25</a:t>
+              <a:t>9/25/25</a:t>
             </a:fld>
             <a:endParaRPr lang="en-US" noProof="0"/>
           </a:p>
@@ -22358,7 +22444,7 @@
           <a:p>
             <a:fld id="{1FB8923F-5D14-B54D-83C1-CAEEA58BAC7F}" type="datetime1">
               <a:rPr lang="en-US" noProof="0" smtClean="0"/>
-              <a:t>9/24/25</a:t>
+              <a:t>9/25/25</a:t>
             </a:fld>
             <a:endParaRPr lang="en-US" noProof="0"/>
           </a:p>
@@ -24694,7 +24780,7 @@
           <a:p>
             <a:fld id="{F95F88DC-79E6-1C4C-8041-BD0543DAE3E2}" type="datetime1">
               <a:rPr lang="en-US" noProof="0" smtClean="0"/>
-              <a:t>9/24/25</a:t>
+              <a:t>9/25/25</a:t>
             </a:fld>
             <a:endParaRPr lang="en-US" noProof="0"/>
           </a:p>
@@ -27010,7 +27096,7 @@
           <a:p>
             <a:fld id="{8A5667DB-2839-644E-8444-80F2C4160D1F}" type="datetime1">
               <a:rPr lang="en-US" noProof="0" smtClean="0"/>
-              <a:t>9/24/25</a:t>
+              <a:t>9/25/25</a:t>
             </a:fld>
             <a:endParaRPr lang="en-US" noProof="0"/>
           </a:p>
@@ -36765,7 +36851,7 @@
           <a:p>
             <a:fld id="{D67F9C40-D2DD-1441-80A2-6756AC3A0FAA}" type="datetime1">
               <a:rPr lang="en-US" noProof="0" smtClean="0"/>
-              <a:t>9/24/25</a:t>
+              <a:t>9/25/25</a:t>
             </a:fld>
             <a:endParaRPr lang="en-US" noProof="0"/>
           </a:p>
@@ -37957,7 +38043,7 @@
           <a:p>
             <a:fld id="{04CAA61E-7AEC-D342-8104-4DFD59E7350E}" type="datetime1">
               <a:rPr lang="en-US" smtClean="0"/>
-              <a:t>9/24/25</a:t>
+              <a:t>9/25/25</a:t>
             </a:fld>
             <a:endParaRPr lang="en-US"/>
           </a:p>
@@ -38424,7 +38510,7 @@
           <a:p>
             <a:fld id="{04CAA61E-7AEC-D342-8104-4DFD59E7350E}" type="datetime1">
               <a:rPr lang="en-US" smtClean="0"/>
-              <a:t>9/24/25</a:t>
+              <a:t>9/25/25</a:t>
             </a:fld>
             <a:endParaRPr lang="en-US"/>
           </a:p>
@@ -38798,7 +38884,7 @@
           <a:p>
             <a:fld id="{04CAA61E-7AEC-D342-8104-4DFD59E7350E}" type="datetime1">
               <a:rPr lang="en-US" smtClean="0"/>
-              <a:t>9/24/25</a:t>
+              <a:t>9/25/25</a:t>
             </a:fld>
             <a:endParaRPr lang="en-US"/>
           </a:p>
@@ -39038,7 +39124,7 @@
           <a:p>
             <a:fld id="{04CAA61E-7AEC-D342-8104-4DFD59E7350E}" type="datetime1">
               <a:rPr lang="en-US" smtClean="0"/>
-              <a:t>9/24/25</a:t>
+              <a:t>9/25/25</a:t>
             </a:fld>
             <a:endParaRPr lang="en-US"/>
           </a:p>
@@ -39467,7 +39553,7 @@
           <a:p>
             <a:fld id="{04CAA61E-7AEC-D342-8104-4DFD59E7350E}" type="datetime1">
               <a:rPr lang="en-US" smtClean="0"/>
-              <a:t>9/24/25</a:t>
+              <a:t>9/25/25</a:t>
             </a:fld>
             <a:endParaRPr lang="en-US"/>
           </a:p>
@@ -39753,6 +39839,743 @@
   <p:cSld>
     <p:spTree>
       <p:nvGrpSpPr>
+        <p:cNvPr id="1" name="">
+          <a:extLst>
+            <a:ext uri="{FF2B5EF4-FFF2-40B4-BE49-F238E27FC236}">
+              <a16:creationId xmlns:a16="http://schemas.microsoft.com/office/drawing/2014/main" id="{F9995EA9-C09C-D005-0E8C-AB15DBEE1DFE}"/>
+            </a:ext>
+          </a:extLst>
+        </p:cNvPr>
+        <p:cNvGrpSpPr/>
+        <p:nvPr/>
+      </p:nvGrpSpPr>
+      <p:grpSpPr>
+        <a:xfrm>
+          <a:off x="0" y="0"/>
+          <a:ext cx="0" cy="0"/>
+          <a:chOff x="0" y="0"/>
+          <a:chExt cx="0" cy="0"/>
+        </a:xfrm>
+      </p:grpSpPr>
+      <p:sp>
+        <p:nvSpPr>
+          <p:cNvPr id="3" name="Fußzeilenplatzhalter 2">
+            <a:extLst>
+              <a:ext uri="{FF2B5EF4-FFF2-40B4-BE49-F238E27FC236}">
+                <a16:creationId xmlns:a16="http://schemas.microsoft.com/office/drawing/2014/main" id="{F56C4173-FE44-6EFD-F99D-185F6EC4E048}"/>
+              </a:ext>
+            </a:extLst>
+          </p:cNvPr>
+          <p:cNvSpPr>
+            <a:spLocks noGrp="1"/>
+          </p:cNvSpPr>
+          <p:nvPr>
+            <p:ph type="ftr" sz="quarter" idx="11"/>
+          </p:nvPr>
+        </p:nvSpPr>
+        <p:spPr/>
+        <p:txBody>
+          <a:bodyPr/>
+          <a:lstStyle/>
+          <a:p>
+            <a:r>
+              <a:rPr lang="en-GB" dirty="0"/>
+              <a:t>Onyinye S. Uche</a:t>
+            </a:r>
+            <a:r>
+              <a:rPr lang="en-US" dirty="0"/>
+              <a:t> &amp; Tianxiang Lu</a:t>
+            </a:r>
+            <a:endParaRPr lang="en-GB" dirty="0"/>
+          </a:p>
+        </p:txBody>
+      </p:sp>
+      <p:sp>
+        <p:nvSpPr>
+          <p:cNvPr id="4" name="Foliennummernplatzhalter 3">
+            <a:extLst>
+              <a:ext uri="{FF2B5EF4-FFF2-40B4-BE49-F238E27FC236}">
+                <a16:creationId xmlns:a16="http://schemas.microsoft.com/office/drawing/2014/main" id="{0E6A6FCA-308A-488B-3B3B-320842BB72A1}"/>
+              </a:ext>
+            </a:extLst>
+          </p:cNvPr>
+          <p:cNvSpPr>
+            <a:spLocks noGrp="1"/>
+          </p:cNvSpPr>
+          <p:nvPr>
+            <p:ph type="sldNum" sz="quarter" idx="12"/>
+          </p:nvPr>
+        </p:nvSpPr>
+        <p:spPr/>
+        <p:txBody>
+          <a:bodyPr/>
+          <a:lstStyle/>
+          <a:p>
+            <a:fld id="{19C38A61-2AC7-4B0E-B80F-DDADD701BB40}" type="slidenum">
+              <a:rPr lang="de-DE" smtClean="0"/>
+              <a:pPr/>
+              <a:t>16</a:t>
+            </a:fld>
+            <a:endParaRPr lang="de-DE"/>
+          </a:p>
+        </p:txBody>
+      </p:sp>
+      <p:sp>
+        <p:nvSpPr>
+          <p:cNvPr id="14" name="Titel 6">
+            <a:extLst>
+              <a:ext uri="{FF2B5EF4-FFF2-40B4-BE49-F238E27FC236}">
+                <a16:creationId xmlns:a16="http://schemas.microsoft.com/office/drawing/2014/main" id="{8AA6A4A2-478A-B82C-034B-BEA5D6602DB9}"/>
+              </a:ext>
+            </a:extLst>
+          </p:cNvPr>
+          <p:cNvSpPr>
+            <a:spLocks noGrp="1"/>
+          </p:cNvSpPr>
+          <p:nvPr>
+            <p:ph type="title"/>
+          </p:nvPr>
+        </p:nvSpPr>
+        <p:spPr>
+          <a:xfrm>
+            <a:off x="420792" y="446959"/>
+            <a:ext cx="8483496" cy="830997"/>
+          </a:xfrm>
+        </p:spPr>
+        <p:txBody>
+          <a:bodyPr/>
+          <a:lstStyle/>
+          <a:p>
+            <a:r>
+              <a:rPr lang="en-US" cap="none" noProof="0" dirty="0"/>
+              <a:t>References</a:t>
+            </a:r>
+          </a:p>
+        </p:txBody>
+      </p:sp>
+      <p:sp>
+        <p:nvSpPr>
+          <p:cNvPr id="16" name="Inhaltsplatzhalter 4">
+            <a:extLst>
+              <a:ext uri="{FF2B5EF4-FFF2-40B4-BE49-F238E27FC236}">
+                <a16:creationId xmlns:a16="http://schemas.microsoft.com/office/drawing/2014/main" id="{937B6B4A-3A0D-C745-0FCE-1FEEDAF92124}"/>
+              </a:ext>
+            </a:extLst>
+          </p:cNvPr>
+          <p:cNvSpPr>
+            <a:spLocks noGrp="1"/>
+          </p:cNvSpPr>
+          <p:nvPr>
+            <p:ph idx="1"/>
+          </p:nvPr>
+        </p:nvSpPr>
+        <p:spPr>
+          <a:xfrm>
+            <a:off x="447028" y="1035049"/>
+            <a:ext cx="11155359" cy="5110917"/>
+          </a:xfrm>
+        </p:spPr>
+        <p:txBody>
+          <a:bodyPr/>
+          <a:lstStyle/>
+          <a:p>
+            <a:r>
+              <a:rPr lang="en-GB" sz="1400" dirty="0"/>
+              <a:t>Byrne, P., Bangera, M., Siegfried, G., et al. (2024). Gartner Magic Quadrant for Observability Platforms. Gartner.</a:t>
+            </a:r>
+          </a:p>
+          <a:p>
+            <a:r>
+              <a:rPr lang="en-GB" sz="1400" dirty="0"/>
+              <a:t>Elastic. (2024). Agentic RAG with </a:t>
+            </a:r>
+            <a:r>
+              <a:rPr lang="en-GB" sz="1400" dirty="0" err="1"/>
+              <a:t>LangChain</a:t>
+            </a:r>
+            <a:r>
+              <a:rPr lang="en-GB" sz="1400" dirty="0"/>
+              <a:t> &amp; Elasticsearch. Elasticsearch Labs.</a:t>
+            </a:r>
+          </a:p>
+          <a:p>
+            <a:r>
+              <a:rPr lang="en-GB" sz="1400" dirty="0"/>
+              <a:t>Elastic. (2025). Banking and Payments Playbook. </a:t>
+            </a:r>
+            <a:r>
+              <a:rPr lang="en-GB" sz="1400" dirty="0">
+                <a:hlinkClick r:id="rId2"/>
+              </a:rPr>
+              <a:t>https://www.elastic.co/pdf/elastic-banking-and-payments-playbook.pdf</a:t>
+            </a:r>
+            <a:r>
+              <a:rPr lang="en-GB" sz="1400" dirty="0"/>
+              <a:t> (Accessed: 2025-07-31)</a:t>
+            </a:r>
+          </a:p>
+          <a:p>
+            <a:r>
+              <a:rPr lang="en-GB" sz="1400" dirty="0"/>
+              <a:t>Elastic. (2025). What is Generative AI? 15 GenAI use cases for the enterprise. </a:t>
+            </a:r>
+            <a:r>
+              <a:rPr lang="en-GB" sz="1400" dirty="0">
+                <a:hlinkClick r:id="rId3"/>
+              </a:rPr>
+              <a:t>https://www.elastic.co/what-is/generative-ai</a:t>
+            </a:r>
+            <a:r>
+              <a:rPr lang="en-GB" sz="1400" dirty="0"/>
+              <a:t> (Accessed: 2025-07-31)</a:t>
+            </a:r>
+          </a:p>
+          <a:p>
+            <a:r>
+              <a:rPr lang="en-GB" sz="1400" dirty="0"/>
+              <a:t>Fernando, C. (2023). Implementing observability for enterprise software systems. In Solution Architecture Patterns for Enterprise: A Guide to Building Enterprise Software Systems (pp. 231–268). </a:t>
+            </a:r>
+            <a:r>
+              <a:rPr lang="en-GB" sz="1400" dirty="0" err="1"/>
+              <a:t>Apress</a:t>
+            </a:r>
+            <a:r>
+              <a:rPr lang="en-GB" sz="1400" dirty="0"/>
+              <a:t>. </a:t>
+            </a:r>
+            <a:r>
+              <a:rPr lang="en-GB" sz="1400" dirty="0">
+                <a:hlinkClick r:id="rId4"/>
+              </a:rPr>
+              <a:t>https://doi.org/10.1007/978-1-4842-8948-8_7</a:t>
+            </a:r>
+            <a:endParaRPr lang="en-GB" sz="1400" dirty="0"/>
+          </a:p>
+          <a:p>
+            <a:r>
+              <a:rPr lang="en-GB" sz="1400" dirty="0"/>
+              <a:t>IBM (</a:t>
+            </a:r>
+            <a:r>
+              <a:rPr lang="en-GB" sz="1400" dirty="0" err="1"/>
+              <a:t>Belcic</a:t>
+            </a:r>
+            <a:r>
+              <a:rPr lang="en-GB" sz="1400" dirty="0"/>
+              <a:t>, I., &amp; Stryker, C.). (2025). What is agentic RAG? </a:t>
+            </a:r>
+            <a:r>
+              <a:rPr lang="en-GB" sz="1400" dirty="0">
+                <a:hlinkClick r:id="rId5"/>
+              </a:rPr>
+              <a:t>https://www.ibm.com/think/topics/agentic-rag</a:t>
+            </a:r>
+            <a:r>
+              <a:rPr lang="en-GB" sz="1400" dirty="0"/>
+              <a:t> (Accessed: 2025-07-31)</a:t>
+            </a:r>
+          </a:p>
+          <a:p>
+            <a:r>
+              <a:rPr lang="en-GB" sz="1400" dirty="0"/>
+              <a:t>Ji, C., &amp; Luo, H. (2025). Leveraging large language model for intelligent log processing and autonomous debugging in cloud AI platforms. </a:t>
+            </a:r>
+            <a:r>
+              <a:rPr lang="en-GB" sz="1400" dirty="0" err="1"/>
+              <a:t>arXiv</a:t>
+            </a:r>
+            <a:r>
+              <a:rPr lang="en-GB" sz="1400" dirty="0"/>
+              <a:t>. </a:t>
+            </a:r>
+            <a:r>
+              <a:rPr lang="en-GB" sz="1400" dirty="0">
+                <a:hlinkClick r:id="rId6"/>
+              </a:rPr>
+              <a:t>https://doi.org/10.48550/arXiv.2506.17900</a:t>
+            </a:r>
+            <a:endParaRPr lang="en-GB" sz="1400" dirty="0"/>
+          </a:p>
+          <a:p>
+            <a:r>
+              <a:rPr lang="en-GB" sz="1400" dirty="0"/>
+              <a:t>Joshi, J. V. (2023). The future of document retrieval: Harnessing the power of OpenAI and AWS Kendra. In IEEE 15th International Conference on Computational Intelligence and Communication Networks (CICN) (pp. 608–613). IEEE. </a:t>
+            </a:r>
+            <a:r>
+              <a:rPr lang="en-GB" sz="1400" dirty="0">
+                <a:hlinkClick r:id="rId7"/>
+              </a:rPr>
+              <a:t>https://doi.org/10.1109/CICN59264.2023.10402210</a:t>
+            </a:r>
+            <a:endParaRPr lang="en-GB" sz="1400" dirty="0"/>
+          </a:p>
+          <a:p>
+            <a:r>
+              <a:rPr lang="en-GB" sz="1400" dirty="0"/>
+              <a:t>Khanda, R. (2024). Agentic AI-driven technical troubleshooting for enterprise systems: A novel weighted retrieval-augmented generation paradigm. </a:t>
+            </a:r>
+            <a:r>
+              <a:rPr lang="en-GB" sz="1400" dirty="0" err="1"/>
+              <a:t>arXiv</a:t>
+            </a:r>
+            <a:r>
+              <a:rPr lang="en-GB" sz="1400" dirty="0"/>
+              <a:t>. </a:t>
+            </a:r>
+            <a:r>
+              <a:rPr lang="en-GB" sz="1400" dirty="0">
+                <a:hlinkClick r:id="rId8"/>
+              </a:rPr>
+              <a:t>https://doi.org/10.48550/arXiv.2412.12006</a:t>
+            </a:r>
+            <a:endParaRPr lang="en-GB" sz="1400" dirty="0"/>
+          </a:p>
+          <a:p>
+            <a:r>
+              <a:rPr lang="en-GB" sz="1400" dirty="0"/>
+              <a:t>Kumar, R., Zeng, J., &amp; Shah, V. (2025). Building an enterprise-ready generative AI platform on AWS. Amazon Web Services</a:t>
+            </a:r>
+          </a:p>
+          <a:p>
+            <a:r>
+              <a:rPr lang="en-GB" sz="1400" dirty="0"/>
+              <a:t>Livens, J. (2024). What is observability? Not just logs, metrics and traces. Dynatrace.</a:t>
+            </a:r>
+          </a:p>
+          <a:p>
+            <a:r>
+              <a:rPr lang="en-GB" sz="1400" dirty="0"/>
+              <a:t>Mayer, H., Yee, L., Chui, M., et al. (2025). AI in the workplace: A report for 2025. McKinsey.</a:t>
+            </a:r>
+          </a:p>
+          <a:p>
+            <a:endParaRPr lang="en-GB" sz="1400" dirty="0"/>
+          </a:p>
+        </p:txBody>
+      </p:sp>
+      <p:sp>
+        <p:nvSpPr>
+          <p:cNvPr id="6" name="Datumsplatzhalter 1">
+            <a:extLst>
+              <a:ext uri="{FF2B5EF4-FFF2-40B4-BE49-F238E27FC236}">
+                <a16:creationId xmlns:a16="http://schemas.microsoft.com/office/drawing/2014/main" id="{516FACA0-669B-8065-37CD-69904CE32210}"/>
+              </a:ext>
+            </a:extLst>
+          </p:cNvPr>
+          <p:cNvSpPr>
+            <a:spLocks noGrp="1"/>
+          </p:cNvSpPr>
+          <p:nvPr>
+            <p:ph type="dt" sz="half" idx="10"/>
+          </p:nvPr>
+        </p:nvSpPr>
+        <p:spPr>
+          <a:xfrm>
+            <a:off x="447028" y="6667836"/>
+            <a:ext cx="468000" cy="135423"/>
+          </a:xfrm>
+        </p:spPr>
+        <p:txBody>
+          <a:bodyPr/>
+          <a:lstStyle/>
+          <a:p>
+            <a:fld id="{04CAA61E-7AEC-D342-8104-4DFD59E7350E}" type="datetime1">
+              <a:rPr lang="en-US" smtClean="0"/>
+              <a:t>9/25/25</a:t>
+            </a:fld>
+            <a:endParaRPr lang="en-US"/>
+          </a:p>
+        </p:txBody>
+      </p:sp>
+    </p:spTree>
+    <p:extLst>
+      <p:ext uri="{BB962C8B-B14F-4D97-AF65-F5344CB8AC3E}">
+        <p14:creationId xmlns:p14="http://schemas.microsoft.com/office/powerpoint/2010/main" val="3348113683"/>
+      </p:ext>
+    </p:extLst>
+  </p:cSld>
+  <p:clrMapOvr>
+    <a:masterClrMapping/>
+  </p:clrMapOvr>
+</p:sld>
+</file>
+
+<file path=ppt/slides/slide17.xml><?xml version="1.0" encoding="utf-8"?>
+<p:sld xmlns:a="http://schemas.openxmlformats.org/drawingml/2006/main" xmlns:r="http://schemas.openxmlformats.org/officeDocument/2006/relationships" xmlns:p="http://schemas.openxmlformats.org/presentationml/2006/main">
+  <p:cSld>
+    <p:spTree>
+      <p:nvGrpSpPr>
+        <p:cNvPr id="1" name="">
+          <a:extLst>
+            <a:ext uri="{FF2B5EF4-FFF2-40B4-BE49-F238E27FC236}">
+              <a16:creationId xmlns:a16="http://schemas.microsoft.com/office/drawing/2014/main" id="{7FD809E5-A038-C961-BCA9-92894BCF93A2}"/>
+            </a:ext>
+          </a:extLst>
+        </p:cNvPr>
+        <p:cNvGrpSpPr/>
+        <p:nvPr/>
+      </p:nvGrpSpPr>
+      <p:grpSpPr>
+        <a:xfrm>
+          <a:off x="0" y="0"/>
+          <a:ext cx="0" cy="0"/>
+          <a:chOff x="0" y="0"/>
+          <a:chExt cx="0" cy="0"/>
+        </a:xfrm>
+      </p:grpSpPr>
+      <p:sp>
+        <p:nvSpPr>
+          <p:cNvPr id="3" name="Fußzeilenplatzhalter 2">
+            <a:extLst>
+              <a:ext uri="{FF2B5EF4-FFF2-40B4-BE49-F238E27FC236}">
+                <a16:creationId xmlns:a16="http://schemas.microsoft.com/office/drawing/2014/main" id="{D76401CB-19FE-F12F-6FA4-CBCD49D953F9}"/>
+              </a:ext>
+            </a:extLst>
+          </p:cNvPr>
+          <p:cNvSpPr>
+            <a:spLocks noGrp="1"/>
+          </p:cNvSpPr>
+          <p:nvPr>
+            <p:ph type="ftr" sz="quarter" idx="11"/>
+          </p:nvPr>
+        </p:nvSpPr>
+        <p:spPr/>
+        <p:txBody>
+          <a:bodyPr/>
+          <a:lstStyle/>
+          <a:p>
+            <a:r>
+              <a:rPr lang="en-GB" dirty="0"/>
+              <a:t>Onyinye S. Uche</a:t>
+            </a:r>
+            <a:r>
+              <a:rPr lang="en-US" dirty="0"/>
+              <a:t> &amp; Tianxiang Lu</a:t>
+            </a:r>
+            <a:endParaRPr lang="en-GB" dirty="0"/>
+          </a:p>
+        </p:txBody>
+      </p:sp>
+      <p:sp>
+        <p:nvSpPr>
+          <p:cNvPr id="4" name="Foliennummernplatzhalter 3">
+            <a:extLst>
+              <a:ext uri="{FF2B5EF4-FFF2-40B4-BE49-F238E27FC236}">
+                <a16:creationId xmlns:a16="http://schemas.microsoft.com/office/drawing/2014/main" id="{97B04D65-B39D-C06F-C639-F08075A04335}"/>
+              </a:ext>
+            </a:extLst>
+          </p:cNvPr>
+          <p:cNvSpPr>
+            <a:spLocks noGrp="1"/>
+          </p:cNvSpPr>
+          <p:nvPr>
+            <p:ph type="sldNum" sz="quarter" idx="12"/>
+          </p:nvPr>
+        </p:nvSpPr>
+        <p:spPr/>
+        <p:txBody>
+          <a:bodyPr/>
+          <a:lstStyle/>
+          <a:p>
+            <a:fld id="{19C38A61-2AC7-4B0E-B80F-DDADD701BB40}" type="slidenum">
+              <a:rPr lang="de-DE" smtClean="0"/>
+              <a:pPr/>
+              <a:t>17</a:t>
+            </a:fld>
+            <a:endParaRPr lang="de-DE"/>
+          </a:p>
+        </p:txBody>
+      </p:sp>
+      <p:sp>
+        <p:nvSpPr>
+          <p:cNvPr id="14" name="Titel 6">
+            <a:extLst>
+              <a:ext uri="{FF2B5EF4-FFF2-40B4-BE49-F238E27FC236}">
+                <a16:creationId xmlns:a16="http://schemas.microsoft.com/office/drawing/2014/main" id="{B6BF7C91-9FF0-BDAE-DEF7-D70D9EAEBD1A}"/>
+              </a:ext>
+            </a:extLst>
+          </p:cNvPr>
+          <p:cNvSpPr>
+            <a:spLocks noGrp="1"/>
+          </p:cNvSpPr>
+          <p:nvPr>
+            <p:ph type="title"/>
+          </p:nvPr>
+        </p:nvSpPr>
+        <p:spPr>
+          <a:xfrm>
+            <a:off x="420792" y="446959"/>
+            <a:ext cx="8483496" cy="830997"/>
+          </a:xfrm>
+        </p:spPr>
+        <p:txBody>
+          <a:bodyPr/>
+          <a:lstStyle/>
+          <a:p>
+            <a:r>
+              <a:rPr lang="en-US" cap="none" noProof="0" dirty="0"/>
+              <a:t>References</a:t>
+            </a:r>
+          </a:p>
+        </p:txBody>
+      </p:sp>
+      <p:sp>
+        <p:nvSpPr>
+          <p:cNvPr id="16" name="Inhaltsplatzhalter 4">
+            <a:extLst>
+              <a:ext uri="{FF2B5EF4-FFF2-40B4-BE49-F238E27FC236}">
+                <a16:creationId xmlns:a16="http://schemas.microsoft.com/office/drawing/2014/main" id="{C3E0FFD0-952F-BBB1-1A64-FF1C1D8040ED}"/>
+              </a:ext>
+            </a:extLst>
+          </p:cNvPr>
+          <p:cNvSpPr>
+            <a:spLocks noGrp="1"/>
+          </p:cNvSpPr>
+          <p:nvPr>
+            <p:ph idx="1"/>
+          </p:nvPr>
+        </p:nvSpPr>
+        <p:spPr>
+          <a:xfrm>
+            <a:off x="447028" y="1035050"/>
+            <a:ext cx="11095398" cy="4787900"/>
+          </a:xfrm>
+        </p:spPr>
+        <p:txBody>
+          <a:bodyPr/>
+          <a:lstStyle/>
+          <a:p>
+            <a:pPr marL="0" indent="0">
+              <a:buNone/>
+            </a:pPr>
+            <a:endParaRPr lang="en-GB" sz="1400" dirty="0"/>
+          </a:p>
+          <a:p>
+            <a:r>
+              <a:rPr lang="en-GB" sz="1400" dirty="0"/>
+              <a:t>Niedermaier, S., Koetter, F., Freymann, A., et al. (2019). On observability and monitoring of distributed systems—An industry interview study. In S. </a:t>
+            </a:r>
+            <a:r>
+              <a:rPr lang="en-GB" sz="1400" dirty="0" err="1"/>
+              <a:t>Yangui</a:t>
+            </a:r>
+            <a:r>
+              <a:rPr lang="en-GB" sz="1400" dirty="0"/>
+              <a:t>, I. </a:t>
+            </a:r>
+            <a:r>
+              <a:rPr lang="en-GB" sz="1400" dirty="0" err="1"/>
+              <a:t>Bouassida</a:t>
+            </a:r>
+            <a:r>
+              <a:rPr lang="en-GB" sz="1400" dirty="0"/>
+              <a:t> Rodriguez, K. </a:t>
+            </a:r>
+            <a:r>
+              <a:rPr lang="en-GB" sz="1400" dirty="0" err="1"/>
+              <a:t>Drira</a:t>
+            </a:r>
+            <a:r>
+              <a:rPr lang="en-GB" sz="1400" dirty="0"/>
+              <a:t>, &amp; Z. Tari (Eds.), Service-Oriented Computing (Vol. 11895, pp. 36–52). Springer, Cham. </a:t>
+            </a:r>
+            <a:r>
+              <a:rPr lang="en-GB" sz="1400" dirty="0">
+                <a:hlinkClick r:id="rId2"/>
+              </a:rPr>
+              <a:t>https://doi.org/10.1007/978-3-030-33702-5_3</a:t>
+            </a:r>
+            <a:endParaRPr lang="en-GB" sz="1400" dirty="0"/>
+          </a:p>
+          <a:p>
+            <a:r>
+              <a:rPr lang="en-GB" sz="1400" dirty="0"/>
+              <a:t>Pisoni, G., Molnár, B., &amp; Tarcsi, A. (2024). Knowledge management and data analysis techniques for data-driven financial companies. Journal of the Knowledge Economy, 15, 13374–13393. </a:t>
+            </a:r>
+            <a:r>
+              <a:rPr lang="en-GB" sz="1400" dirty="0">
+                <a:hlinkClick r:id="rId3"/>
+              </a:rPr>
+              <a:t>https://doi.org/10.1007/s13132-023-01607-z</a:t>
+            </a:r>
+            <a:endParaRPr lang="en-GB" sz="1400" dirty="0"/>
+          </a:p>
+          <a:p>
+            <a:r>
+              <a:rPr lang="en-GB" sz="1400" dirty="0"/>
+              <a:t>Prabhune, S., &amp; Berndt, D. J. (2024). Deploying large language models with retrieval augmented generation. </a:t>
+            </a:r>
+            <a:r>
+              <a:rPr lang="en-GB" sz="1400" dirty="0" err="1"/>
+              <a:t>arXiv</a:t>
+            </a:r>
+            <a:r>
+              <a:rPr lang="en-GB" sz="1400" dirty="0"/>
+              <a:t>. </a:t>
+            </a:r>
+            <a:r>
+              <a:rPr lang="en-GB" sz="1400" dirty="0">
+                <a:hlinkClick r:id="rId4"/>
+              </a:rPr>
+              <a:t>https://doi.org/10.48550/arXiv.2411.11895</a:t>
+            </a:r>
+            <a:endParaRPr lang="en-GB" sz="1400" dirty="0"/>
+          </a:p>
+          <a:p>
+            <a:r>
+              <a:rPr lang="en-GB" sz="1400" dirty="0" err="1"/>
+              <a:t>Ridzuan</a:t>
+            </a:r>
+            <a:r>
+              <a:rPr lang="en-GB" sz="1400" dirty="0"/>
+              <a:t>, N. N., Masri, M., </a:t>
+            </a:r>
+            <a:r>
+              <a:rPr lang="en-GB" sz="1400" dirty="0" err="1"/>
+              <a:t>Anshari</a:t>
+            </a:r>
+            <a:r>
+              <a:rPr lang="en-GB" sz="1400" dirty="0"/>
+              <a:t>, M., et al. (2024). AI in the financial sector: The line between innovation, regulation and ethical responsibility. Information, 15, 432. </a:t>
+            </a:r>
+            <a:r>
+              <a:rPr lang="en-GB" sz="1400" dirty="0">
+                <a:hlinkClick r:id="rId5"/>
+              </a:rPr>
+              <a:t>https://doi.org/10.3390/info15080432</a:t>
+            </a:r>
+            <a:endParaRPr lang="en-GB" sz="1400" dirty="0"/>
+          </a:p>
+          <a:p>
+            <a:r>
+              <a:rPr lang="en-GB" sz="1400" dirty="0"/>
+              <a:t>Souza, A. (2024). Observability and monitoring. In Tech Leadership Playbook: Building and Sustaining High-Impact Technology Teams (pp. 171–191). </a:t>
+            </a:r>
+            <a:r>
+              <a:rPr lang="en-GB" sz="1400" dirty="0" err="1"/>
+              <a:t>Apress</a:t>
+            </a:r>
+            <a:r>
+              <a:rPr lang="en-GB" sz="1400" dirty="0"/>
+              <a:t>. </a:t>
+            </a:r>
+            <a:r>
+              <a:rPr lang="en-GB" sz="1400" dirty="0">
+                <a:hlinkClick r:id="rId6"/>
+              </a:rPr>
+              <a:t>https://doi.org/10.1007/979-8-8688-0543-1_7</a:t>
+            </a:r>
+            <a:endParaRPr lang="en-GB" sz="1400" dirty="0"/>
+          </a:p>
+          <a:p>
+            <a:r>
+              <a:rPr lang="en-GB" sz="1400" dirty="0"/>
+              <a:t>Usman, M., Ferlin, S., </a:t>
+            </a:r>
+            <a:r>
+              <a:rPr lang="en-GB" sz="1400" dirty="0" err="1"/>
+              <a:t>Brunstrom</a:t>
+            </a:r>
+            <a:r>
+              <a:rPr lang="en-GB" sz="1400" dirty="0"/>
+              <a:t>, A., et al. (2022). A survey on observability of distributed edge &amp; container-based microservices. IEEE Access, 10, 86904–86919. </a:t>
+            </a:r>
+            <a:r>
+              <a:rPr lang="en-GB" sz="1400" dirty="0">
+                <a:hlinkClick r:id="rId7"/>
+              </a:rPr>
+              <a:t>https://doi.org/10.1109/ACCESS.2022.3193102</a:t>
+            </a:r>
+            <a:endParaRPr lang="en-GB" sz="1400" dirty="0"/>
+          </a:p>
+          <a:p>
+            <a:r>
+              <a:rPr lang="en-GB" sz="1400" dirty="0"/>
+              <a:t>Xu, J. (2024). GenAI and LLM for financial institutions: A corporate strategic survey. Social Science Research Network. </a:t>
+            </a:r>
+            <a:r>
+              <a:rPr lang="en-GB" sz="1400" dirty="0">
+                <a:hlinkClick r:id="rId8"/>
+              </a:rPr>
+              <a:t>https://doi.org/10.2139/ssrn.4988118</a:t>
+            </a:r>
+            <a:endParaRPr lang="en-GB" sz="1400" dirty="0"/>
+          </a:p>
+          <a:p>
+            <a:r>
+              <a:rPr lang="en-GB" sz="1400" dirty="0"/>
+              <a:t>Zhang, L., Jia, T., Jia, M., et al. (2024). A survey of AIOps for failure management in the era of large language models. </a:t>
+            </a:r>
+            <a:r>
+              <a:rPr lang="en-GB" sz="1400" dirty="0" err="1"/>
+              <a:t>arXiv</a:t>
+            </a:r>
+            <a:r>
+              <a:rPr lang="en-GB" sz="1400" dirty="0"/>
+              <a:t>. </a:t>
+            </a:r>
+            <a:r>
+              <a:rPr lang="en-GB" sz="1400" dirty="0">
+                <a:hlinkClick r:id="rId9"/>
+              </a:rPr>
+              <a:t>https://doi.org/10.48550/arXiv.2406.11213</a:t>
+            </a:r>
+            <a:endParaRPr lang="en-GB" sz="1400" dirty="0"/>
+          </a:p>
+        </p:txBody>
+      </p:sp>
+      <p:sp>
+        <p:nvSpPr>
+          <p:cNvPr id="6" name="Datumsplatzhalter 1">
+            <a:extLst>
+              <a:ext uri="{FF2B5EF4-FFF2-40B4-BE49-F238E27FC236}">
+                <a16:creationId xmlns:a16="http://schemas.microsoft.com/office/drawing/2014/main" id="{1D350899-C465-0902-533A-61AB3D9DA855}"/>
+              </a:ext>
+            </a:extLst>
+          </p:cNvPr>
+          <p:cNvSpPr>
+            <a:spLocks noGrp="1"/>
+          </p:cNvSpPr>
+          <p:nvPr>
+            <p:ph type="dt" sz="half" idx="10"/>
+          </p:nvPr>
+        </p:nvSpPr>
+        <p:spPr>
+          <a:xfrm>
+            <a:off x="447028" y="6667836"/>
+            <a:ext cx="468000" cy="135423"/>
+          </a:xfrm>
+        </p:spPr>
+        <p:txBody>
+          <a:bodyPr/>
+          <a:lstStyle/>
+          <a:p>
+            <a:fld id="{04CAA61E-7AEC-D342-8104-4DFD59E7350E}" type="datetime1">
+              <a:rPr lang="en-US" smtClean="0"/>
+              <a:t>9/25/25</a:t>
+            </a:fld>
+            <a:endParaRPr lang="en-US"/>
+          </a:p>
+        </p:txBody>
+      </p:sp>
+    </p:spTree>
+    <p:extLst>
+      <p:ext uri="{BB962C8B-B14F-4D97-AF65-F5344CB8AC3E}">
+        <p14:creationId xmlns:p14="http://schemas.microsoft.com/office/powerpoint/2010/main" val="4094985890"/>
+      </p:ext>
+    </p:extLst>
+  </p:cSld>
+  <p:clrMapOvr>
+    <a:masterClrMapping/>
+  </p:clrMapOvr>
+</p:sld>
+</file>
+
+<file path=ppt/slides/slide18.xml><?xml version="1.0" encoding="utf-8"?>
+<p:sld xmlns:a="http://schemas.openxmlformats.org/drawingml/2006/main" xmlns:r="http://schemas.openxmlformats.org/officeDocument/2006/relationships" xmlns:p="http://schemas.openxmlformats.org/presentationml/2006/main">
+  <p:cSld>
+    <p:spTree>
+      <p:nvGrpSpPr>
         <p:cNvPr id="1" name=""/>
         <p:cNvGrpSpPr/>
         <p:nvPr/>
@@ -39922,10 +40745,10 @@
       </p:sp>
       <p:pic>
         <p:nvPicPr>
-          <p:cNvPr id="8" name="Picture 7" descr="A qr code with black squares&#10;&#10;AI-generated content may be incorrect.">
-            <a:extLst>
-              <a:ext uri="{FF2B5EF4-FFF2-40B4-BE49-F238E27FC236}">
-                <a16:creationId xmlns:a16="http://schemas.microsoft.com/office/drawing/2014/main" id="{16AB1FFD-E49A-369A-9D0E-3B87989E4B8B}"/>
+          <p:cNvPr id="6" name="Picture 5" descr="A qr code with black squares&#10;&#10;AI-generated content may be incorrect.">
+            <a:extLst>
+              <a:ext uri="{FF2B5EF4-FFF2-40B4-BE49-F238E27FC236}">
+                <a16:creationId xmlns:a16="http://schemas.microsoft.com/office/drawing/2014/main" id="{246F8CC7-EF6D-28C6-153B-75C59EEAC0AE}"/>
               </a:ext>
             </a:extLst>
           </p:cNvPr>
@@ -39948,14 +40771,119 @@
         </p:blipFill>
         <p:spPr>
           <a:xfrm>
-            <a:off x="6418076" y="1372201"/>
-            <a:ext cx="3498272" cy="3498272"/>
+            <a:off x="6418076" y="1256979"/>
+            <a:ext cx="3725056" cy="3725056"/>
           </a:xfrm>
           <a:prstGeom prst="rect">
             <a:avLst/>
           </a:prstGeom>
         </p:spPr>
       </p:pic>
+      <p:sp>
+        <p:nvSpPr>
+          <p:cNvPr id="9" name="TextBox 8">
+            <a:extLst>
+              <a:ext uri="{FF2B5EF4-FFF2-40B4-BE49-F238E27FC236}">
+                <a16:creationId xmlns:a16="http://schemas.microsoft.com/office/drawing/2014/main" id="{9F28A915-B016-B43A-0A3B-465FAE504A08}"/>
+              </a:ext>
+            </a:extLst>
+          </p:cNvPr>
+          <p:cNvSpPr txBox="1"/>
+          <p:nvPr/>
+        </p:nvSpPr>
+        <p:spPr>
+          <a:xfrm>
+            <a:off x="306128" y="1421857"/>
+            <a:ext cx="4523674" cy="590931"/>
+          </a:xfrm>
+          <a:prstGeom prst="rect">
+            <a:avLst/>
+          </a:prstGeom>
+          <a:noFill/>
+          <a:ln>
+            <a:noFill/>
+          </a:ln>
+        </p:spPr>
+        <p:txBody>
+          <a:bodyPr wrap="none" lIns="0" tIns="0" rIns="0" bIns="0" rtlCol="0">
+            <a:spAutoFit/>
+          </a:bodyPr>
+          <a:lstStyle/>
+          <a:p>
+            <a:pPr>
+              <a:lnSpc>
+                <a:spcPct val="120000"/>
+              </a:lnSpc>
+            </a:pPr>
+            <a:r>
+              <a:rPr lang="en-GB" sz="1700" b="1" dirty="0">
+                <a:solidFill>
+                  <a:schemeClr val="bg1"/>
+                </a:solidFill>
+              </a:rPr>
+              <a:t>Data in </a:t>
+            </a:r>
+            <a:r>
+              <a:rPr lang="en-GB" sz="1700" b="1" dirty="0" err="1">
+                <a:solidFill>
+                  <a:schemeClr val="bg1"/>
+                </a:solidFill>
+              </a:rPr>
+              <a:t>Github</a:t>
+            </a:r>
+            <a:r>
+              <a:rPr lang="en-GB" sz="1700" b="1" dirty="0">
+                <a:solidFill>
+                  <a:schemeClr val="bg1"/>
+                </a:solidFill>
+              </a:rPr>
+              <a:t>: </a:t>
+            </a:r>
+          </a:p>
+          <a:p>
+            <a:r>
+              <a:rPr lang="en-GB" b="1" dirty="0">
+                <a:solidFill>
+                  <a:schemeClr val="bg1"/>
+                </a:solidFill>
+              </a:rPr>
+              <a:t>https://</a:t>
+            </a:r>
+            <a:r>
+              <a:rPr lang="en-GB" b="1" dirty="0" err="1">
+                <a:solidFill>
+                  <a:schemeClr val="bg1"/>
+                </a:solidFill>
+              </a:rPr>
+              <a:t>github.com</a:t>
+            </a:r>
+            <a:r>
+              <a:rPr lang="en-GB" b="1" dirty="0">
+                <a:solidFill>
+                  <a:schemeClr val="bg1"/>
+                </a:solidFill>
+              </a:rPr>
+              <a:t>/Prof-it/</a:t>
+            </a:r>
+            <a:r>
+              <a:rPr lang="en-GB" b="1" dirty="0" err="1">
+                <a:solidFill>
+                  <a:schemeClr val="bg1"/>
+                </a:solidFill>
+              </a:rPr>
+              <a:t>llm</a:t>
+            </a:r>
+            <a:r>
+              <a:rPr lang="en-GB" b="1" dirty="0">
+                <a:solidFill>
+                  <a:schemeClr val="bg1"/>
+                </a:solidFill>
+              </a:rPr>
+              <a:t>-observability</a:t>
+            </a:r>
+          </a:p>
+        </p:txBody>
+      </p:sp>
     </p:spTree>
     <p:extLst>
       <p:ext uri="{BB962C8B-B14F-4D97-AF65-F5344CB8AC3E}">
@@ -40009,7 +40937,7 @@
           <a:p>
             <a:fld id="{9DE2538E-986B-6C46-B955-8C701E8C89AF}" type="datetime1">
               <a:rPr lang="en-US" smtClean="0"/>
-              <a:t>9/24/25</a:t>
+              <a:t>9/25/25</a:t>
             </a:fld>
             <a:endParaRPr lang="en-US" dirty="0"/>
           </a:p>
@@ -41859,7 +42787,7 @@
           <a:p>
             <a:fld id="{04CAA61E-7AEC-D342-8104-4DFD59E7350E}" type="datetime1">
               <a:rPr lang="en-US" smtClean="0"/>
-              <a:t>9/24/25</a:t>
+              <a:t>9/25/25</a:t>
             </a:fld>
             <a:endParaRPr lang="en-US"/>
           </a:p>
@@ -42876,7 +43804,7 @@
           <a:p>
             <a:fld id="{C1F6E0D2-EE34-EA4B-A3FA-4E5E952E1C17}" type="datetime1">
               <a:rPr lang="en-US" smtClean="0"/>
-              <a:t>9/24/25</a:t>
+              <a:t>9/25/25</a:t>
             </a:fld>
             <a:endParaRPr lang="en-US"/>
           </a:p>
@@ -44330,7 +45258,7 @@
           <a:p>
             <a:fld id="{04CAA61E-7AEC-D342-8104-4DFD59E7350E}" type="datetime1">
               <a:rPr lang="en-US" smtClean="0"/>
-              <a:t>9/24/25</a:t>
+              <a:t>9/25/25</a:t>
             </a:fld>
             <a:endParaRPr lang="en-US"/>
           </a:p>
@@ -44575,7 +45503,7 @@
           <a:p>
             <a:fld id="{04CAA61E-7AEC-D342-8104-4DFD59E7350E}" type="datetime1">
               <a:rPr lang="en-US" smtClean="0"/>
-              <a:t>9/24/25</a:t>
+              <a:t>9/25/25</a:t>
             </a:fld>
             <a:endParaRPr lang="en-US"/>
           </a:p>
@@ -46736,6 +47664,18 @@
 </file>
 
 <file path=customXml/item1.xml><?xml version="1.0" encoding="utf-8"?>
+<p:properties xmlns:p="http://schemas.microsoft.com/office/2006/metadata/properties" xmlns:xsi="http://www.w3.org/2001/XMLSchema-instance" xmlns:pc="http://schemas.microsoft.com/office/infopath/2007/PartnerControls">
+  <documentManagement>
+    <TaxCatchAll xmlns="0ec0e1a2-438f-4e69-8279-a10b6902627d" xsi:nil="true"/>
+    <lcf76f155ced4ddcb4097134ff3c332f xmlns="4b2a1b0d-3316-4dbf-b4fb-ddd40a0c73ef">
+      <Terms xmlns="http://schemas.microsoft.com/office/infopath/2007/PartnerControls"/>
+    </lcf76f155ced4ddcb4097134ff3c332f>
+    <Done xmlns="4b2a1b0d-3316-4dbf-b4fb-ddd40a0c73ef" xsi:nil="true"/>
+  </documentManagement>
+</p:properties>
+</file>
+
+<file path=customXml/item2.xml><?xml version="1.0" encoding="utf-8"?>
 <?mso-contentType ?>
 <FormTemplates xmlns="http://schemas.microsoft.com/sharepoint/v3/contenttype/forms">
   <Display>DocumentLibraryForm</Display>
@@ -46744,7 +47684,7 @@
 </FormTemplates>
 </file>
 
-<file path=customXml/item2.xml><?xml version="1.0" encoding="utf-8"?>
+<file path=customXml/item3.xml><?xml version="1.0" encoding="utf-8"?>
 <ct:contentTypeSchema xmlns:ct="http://schemas.microsoft.com/office/2006/metadata/contentType" xmlns:ma="http://schemas.microsoft.com/office/2006/metadata/properties/metaAttributes" ct:_="" ma:_="" ma:contentTypeName="Document" ma:contentTypeID="0x010100DA9CB16ACBBB944AA85C26E4A670FDAD" ma:contentTypeVersion="15" ma:contentTypeDescription="Create a new document." ma:contentTypeScope="" ma:versionID="20f808c99518c3221eb4f4f3ac033d06">
   <xsd:schema xmlns:xsd="http://www.w3.org/2001/XMLSchema" xmlns:xs="http://www.w3.org/2001/XMLSchema" xmlns:p="http://schemas.microsoft.com/office/2006/metadata/properties" xmlns:ns2="4b2a1b0d-3316-4dbf-b4fb-ddd40a0c73ef" xmlns:ns3="0ec0e1a2-438f-4e69-8279-a10b6902627d" targetNamespace="http://schemas.microsoft.com/office/2006/metadata/properties" ma:root="true" ma:fieldsID="79aeb7d1c600a07da2b8477b74331c48" ns2:_="" ns3:_="">
     <xsd:import namespace="4b2a1b0d-3316-4dbf-b4fb-ddd40a0c73ef"/>
@@ -46969,19 +47909,24 @@
 </ct:contentTypeSchema>
 </file>
 
-<file path=customXml/item3.xml><?xml version="1.0" encoding="utf-8"?>
-<p:properties xmlns:p="http://schemas.microsoft.com/office/2006/metadata/properties" xmlns:xsi="http://www.w3.org/2001/XMLSchema-instance" xmlns:pc="http://schemas.microsoft.com/office/infopath/2007/PartnerControls">
-  <documentManagement>
-    <TaxCatchAll xmlns="0ec0e1a2-438f-4e69-8279-a10b6902627d" xsi:nil="true"/>
-    <lcf76f155ced4ddcb4097134ff3c332f xmlns="4b2a1b0d-3316-4dbf-b4fb-ddd40a0c73ef">
-      <Terms xmlns="http://schemas.microsoft.com/office/infopath/2007/PartnerControls"/>
-    </lcf76f155ced4ddcb4097134ff3c332f>
-    <Done xmlns="4b2a1b0d-3316-4dbf-b4fb-ddd40a0c73ef" xsi:nil="true"/>
-  </documentManagement>
-</p:properties>
+<file path=customXml/itemProps1.xml><?xml version="1.0" encoding="utf-8"?>
+<ds:datastoreItem xmlns:ds="http://schemas.openxmlformats.org/officeDocument/2006/customXml" ds:itemID="{AA4DE7B9-C83D-488F-A39C-3AD78CD896DA}">
+  <ds:schemaRefs>
+    <ds:schemaRef ds:uri="http://schemas.openxmlformats.org/package/2006/metadata/core-properties"/>
+    <ds:schemaRef ds:uri="http://purl.org/dc/elements/1.1/"/>
+    <ds:schemaRef ds:uri="http://schemas.microsoft.com/office/2006/documentManagement/types"/>
+    <ds:schemaRef ds:uri="0ec0e1a2-438f-4e69-8279-a10b6902627d"/>
+    <ds:schemaRef ds:uri="4b2a1b0d-3316-4dbf-b4fb-ddd40a0c73ef"/>
+    <ds:schemaRef ds:uri="http://www.w3.org/XML/1998/namespace"/>
+    <ds:schemaRef ds:uri="http://purl.org/dc/dcmitype/"/>
+    <ds:schemaRef ds:uri="http://schemas.microsoft.com/office/infopath/2007/PartnerControls"/>
+    <ds:schemaRef ds:uri="http://schemas.microsoft.com/office/2006/metadata/properties"/>
+    <ds:schemaRef ds:uri="http://purl.org/dc/terms/"/>
+  </ds:schemaRefs>
+</ds:datastoreItem>
 </file>
 
-<file path=customXml/itemProps1.xml><?xml version="1.0" encoding="utf-8"?>
+<file path=customXml/itemProps2.xml><?xml version="1.0" encoding="utf-8"?>
 <ds:datastoreItem xmlns:ds="http://schemas.openxmlformats.org/officeDocument/2006/customXml" ds:itemID="{EC194F03-4925-47BE-9A03-84F2B92978B5}">
   <ds:schemaRefs>
     <ds:schemaRef ds:uri="http://schemas.microsoft.com/sharepoint/v3/contenttype/forms"/>
@@ -46989,7 +47934,7 @@
 </ds:datastoreItem>
 </file>
 
-<file path=customXml/itemProps2.xml><?xml version="1.0" encoding="utf-8"?>
+<file path=customXml/itemProps3.xml><?xml version="1.0" encoding="utf-8"?>
 <ds:datastoreItem xmlns:ds="http://schemas.openxmlformats.org/officeDocument/2006/customXml" ds:itemID="{0F870905-182E-4EC8-B101-4C3B9097A93B}">
   <ds:schemaRefs>
     <ds:schemaRef ds:uri="http://schemas.microsoft.com/office/2006/metadata/contentType"/>
@@ -47006,21 +47951,4 @@
     <ds:schemaRef ds:uri="http://schemas.microsoft.com/internal/obd"/>
   </ds:schemaRefs>
 </ds:datastoreItem>
-</file>
-
-<file path=customXml/itemProps3.xml><?xml version="1.0" encoding="utf-8"?>
-<ds:datastoreItem xmlns:ds="http://schemas.openxmlformats.org/officeDocument/2006/customXml" ds:itemID="{AA4DE7B9-C83D-488F-A39C-3AD78CD896DA}">
-  <ds:schemaRefs>
-    <ds:schemaRef ds:uri="http://schemas.openxmlformats.org/package/2006/metadata/core-properties"/>
-    <ds:schemaRef ds:uri="http://purl.org/dc/elements/1.1/"/>
-    <ds:schemaRef ds:uri="http://schemas.microsoft.com/office/2006/documentManagement/types"/>
-    <ds:schemaRef ds:uri="0ec0e1a2-438f-4e69-8279-a10b6902627d"/>
-    <ds:schemaRef ds:uri="4b2a1b0d-3316-4dbf-b4fb-ddd40a0c73ef"/>
-    <ds:schemaRef ds:uri="http://www.w3.org/XML/1998/namespace"/>
-    <ds:schemaRef ds:uri="http://purl.org/dc/dcmitype/"/>
-    <ds:schemaRef ds:uri="http://schemas.microsoft.com/office/infopath/2007/PartnerControls"/>
-    <ds:schemaRef ds:uri="http://schemas.microsoft.com/office/2006/metadata/properties"/>
-    <ds:schemaRef ds:uri="http://purl.org/dc/terms/"/>
-  </ds:schemaRefs>
-</ds:datastoreItem>
 </file>
</xml_diff>